<commit_message>
update links to profiles.ihe.net
</commit_message>
<xml_diff>
--- a/Presentations/IHE-HL7-Working-together.pptx
+++ b/Presentations/IHE-HL7-Working-together.pptx
@@ -218,7 +218,7 @@
           <a:p>
             <a:fld id="{DAE55128-6ADD-450C-9AC2-4CEE47A0A7DB}" type="datetimeFigureOut">
               <a:rPr lang="en-US" smtClean="0"/>
-              <a:t>7/2/2020</a:t>
+              <a:t>9/15/2022</a:t>
             </a:fld>
             <a:endParaRPr lang="en-US"/>
           </a:p>
@@ -282,38 +282,37 @@
           <a:p>
             <a:pPr lvl="0"/>
             <a:r>
-              <a:rPr lang="en-US" smtClean="0"/>
+              <a:rPr lang="en-US"/>
               <a:t>Edit Master text styles</a:t>
             </a:r>
           </a:p>
           <a:p>
             <a:pPr lvl="1"/>
             <a:r>
-              <a:rPr lang="en-US" smtClean="0"/>
+              <a:rPr lang="en-US"/>
               <a:t>Second level</a:t>
             </a:r>
           </a:p>
           <a:p>
             <a:pPr lvl="2"/>
             <a:r>
-              <a:rPr lang="en-US" smtClean="0"/>
+              <a:rPr lang="en-US"/>
               <a:t>Third level</a:t>
             </a:r>
           </a:p>
           <a:p>
             <a:pPr lvl="3"/>
             <a:r>
-              <a:rPr lang="en-US" smtClean="0"/>
+              <a:rPr lang="en-US"/>
               <a:t>Fourth level</a:t>
             </a:r>
           </a:p>
           <a:p>
             <a:pPr lvl="4"/>
             <a:r>
-              <a:rPr lang="en-US" smtClean="0"/>
+              <a:rPr lang="en-US"/>
               <a:t>Fifth level</a:t>
             </a:r>
-            <a:endParaRPr lang="en-US"/>
           </a:p>
         </p:txBody>
       </p:sp>
@@ -712,7 +711,7 @@
           <a:p>
             <a:pPr algn="ctr"/>
             <a:r>
-              <a:rPr lang="en-US" dirty="0" smtClean="0"/>
+              <a:rPr lang="en-US" dirty="0"/>
               <a:t>Place Title Here</a:t>
             </a:r>
             <a:endParaRPr lang="en-US" dirty="0">
@@ -823,10 +822,9 @@
           </a:lstStyle>
           <a:p>
             <a:r>
-              <a:rPr lang="en-US" dirty="0" smtClean="0"/>
+              <a:rPr lang="en-US" dirty="0"/>
               <a:t>Place Title Here</a:t>
             </a:r>
-            <a:endParaRPr lang="en-US" dirty="0"/>
           </a:p>
         </p:txBody>
       </p:sp>
@@ -944,10 +942,9 @@
           </a:lstStyle>
           <a:p>
             <a:r>
-              <a:rPr lang="en-US" dirty="0" smtClean="0"/>
+              <a:rPr lang="en-US" dirty="0"/>
               <a:t>Click to edit Master subtitle style</a:t>
             </a:r>
-            <a:endParaRPr lang="en-US" dirty="0"/>
           </a:p>
         </p:txBody>
       </p:sp>
@@ -1002,10 +999,9 @@
           <a:lstStyle/>
           <a:p>
             <a:r>
-              <a:rPr lang="en-US" dirty="0" smtClean="0"/>
+              <a:rPr lang="en-US" dirty="0"/>
               <a:t>Click to edit Master title style</a:t>
             </a:r>
-            <a:endParaRPr lang="en-US" dirty="0"/>
           </a:p>
         </p:txBody>
       </p:sp>
@@ -1062,38 +1058,37 @@
           <a:p>
             <a:pPr lvl="0"/>
             <a:r>
-              <a:rPr lang="en-US" dirty="0" smtClean="0"/>
+              <a:rPr lang="en-US" dirty="0"/>
               <a:t>Click to edit Master</a:t>
             </a:r>
           </a:p>
           <a:p>
             <a:pPr lvl="1"/>
             <a:r>
-              <a:rPr lang="en-US" dirty="0" smtClean="0"/>
+              <a:rPr lang="en-US" dirty="0"/>
               <a:t>Second level</a:t>
             </a:r>
           </a:p>
           <a:p>
             <a:pPr lvl="2"/>
             <a:r>
-              <a:rPr lang="en-US" dirty="0" smtClean="0"/>
+              <a:rPr lang="en-US" dirty="0"/>
               <a:t>Third level</a:t>
             </a:r>
           </a:p>
           <a:p>
             <a:pPr lvl="3"/>
             <a:r>
-              <a:rPr lang="en-US" dirty="0" smtClean="0"/>
+              <a:rPr lang="en-US" dirty="0"/>
               <a:t>Fourth level</a:t>
             </a:r>
           </a:p>
           <a:p>
             <a:pPr lvl="4"/>
             <a:r>
-              <a:rPr lang="en-US" dirty="0" smtClean="0"/>
+              <a:rPr lang="en-US" dirty="0"/>
               <a:t>Fifth level</a:t>
             </a:r>
-            <a:endParaRPr lang="en-US" dirty="0"/>
           </a:p>
         </p:txBody>
       </p:sp>
@@ -1152,10 +1147,9 @@
           </a:lstStyle>
           <a:p>
             <a:r>
-              <a:rPr lang="en-US" dirty="0" smtClean="0"/>
+              <a:rPr lang="en-US" dirty="0"/>
               <a:t>Click to edit Master title style</a:t>
             </a:r>
-            <a:endParaRPr lang="en-US" dirty="0"/>
           </a:p>
         </p:txBody>
       </p:sp>
@@ -1226,38 +1220,37 @@
           <a:p>
             <a:pPr lvl="0"/>
             <a:r>
-              <a:rPr lang="en-US" dirty="0" smtClean="0"/>
+              <a:rPr lang="en-US" dirty="0"/>
               <a:t>Click to edit Master text styles</a:t>
             </a:r>
           </a:p>
           <a:p>
             <a:pPr lvl="1"/>
             <a:r>
-              <a:rPr lang="en-US" dirty="0" smtClean="0"/>
+              <a:rPr lang="en-US" dirty="0"/>
               <a:t>Second level</a:t>
             </a:r>
           </a:p>
           <a:p>
             <a:pPr lvl="2"/>
             <a:r>
-              <a:rPr lang="en-US" dirty="0" smtClean="0"/>
+              <a:rPr lang="en-US" dirty="0"/>
               <a:t>Third level</a:t>
             </a:r>
           </a:p>
           <a:p>
             <a:pPr lvl="3"/>
             <a:r>
-              <a:rPr lang="en-US" dirty="0" smtClean="0"/>
+              <a:rPr lang="en-US" dirty="0"/>
               <a:t>Fourth level</a:t>
             </a:r>
           </a:p>
           <a:p>
             <a:pPr lvl="4"/>
             <a:r>
-              <a:rPr lang="en-US" dirty="0" smtClean="0"/>
+              <a:rPr lang="en-US" dirty="0"/>
               <a:t>Fifth level</a:t>
             </a:r>
-            <a:endParaRPr lang="en-US" dirty="0"/>
           </a:p>
         </p:txBody>
       </p:sp>
@@ -1328,38 +1321,37 @@
           <a:p>
             <a:pPr lvl="0"/>
             <a:r>
-              <a:rPr lang="en-US" dirty="0" smtClean="0"/>
+              <a:rPr lang="en-US" dirty="0"/>
               <a:t>Click to edit Master text styles</a:t>
             </a:r>
           </a:p>
           <a:p>
             <a:pPr lvl="1"/>
             <a:r>
-              <a:rPr lang="en-US" dirty="0" smtClean="0"/>
+              <a:rPr lang="en-US" dirty="0"/>
               <a:t>Second level</a:t>
             </a:r>
           </a:p>
           <a:p>
             <a:pPr lvl="2"/>
             <a:r>
-              <a:rPr lang="en-US" dirty="0" smtClean="0"/>
+              <a:rPr lang="en-US" dirty="0"/>
               <a:t>Third level</a:t>
             </a:r>
           </a:p>
           <a:p>
             <a:pPr lvl="3"/>
             <a:r>
-              <a:rPr lang="en-US" dirty="0" smtClean="0"/>
+              <a:rPr lang="en-US" dirty="0"/>
               <a:t>Fourth level</a:t>
             </a:r>
           </a:p>
           <a:p>
             <a:pPr lvl="4"/>
             <a:r>
-              <a:rPr lang="en-US" dirty="0" smtClean="0"/>
+              <a:rPr lang="en-US" dirty="0"/>
               <a:t>Fifth level</a:t>
             </a:r>
-            <a:endParaRPr lang="en-US" dirty="0"/>
           </a:p>
         </p:txBody>
       </p:sp>
@@ -1421,10 +1413,9 @@
           </a:lstStyle>
           <a:p>
             <a:r>
-              <a:rPr lang="en-US" dirty="0" smtClean="0"/>
+              <a:rPr lang="en-US" dirty="0"/>
               <a:t>Click to edit Master title style</a:t>
             </a:r>
-            <a:endParaRPr lang="en-US" dirty="0"/>
           </a:p>
         </p:txBody>
       </p:sp>
@@ -1495,38 +1486,37 @@
           <a:p>
             <a:pPr lvl="0"/>
             <a:r>
-              <a:rPr lang="en-US" dirty="0" smtClean="0"/>
+              <a:rPr lang="en-US" dirty="0"/>
               <a:t>Click to edit Master text styles</a:t>
             </a:r>
           </a:p>
           <a:p>
             <a:pPr lvl="1"/>
             <a:r>
-              <a:rPr lang="en-US" dirty="0" smtClean="0"/>
+              <a:rPr lang="en-US" dirty="0"/>
               <a:t>Second level</a:t>
             </a:r>
           </a:p>
           <a:p>
             <a:pPr lvl="2"/>
             <a:r>
-              <a:rPr lang="en-US" dirty="0" smtClean="0"/>
+              <a:rPr lang="en-US" dirty="0"/>
               <a:t>Third level</a:t>
             </a:r>
           </a:p>
           <a:p>
             <a:pPr lvl="3"/>
             <a:r>
-              <a:rPr lang="en-US" dirty="0" smtClean="0"/>
+              <a:rPr lang="en-US" dirty="0"/>
               <a:t>Fourth level</a:t>
             </a:r>
           </a:p>
           <a:p>
             <a:pPr lvl="4"/>
             <a:r>
-              <a:rPr lang="en-US" dirty="0" smtClean="0"/>
+              <a:rPr lang="en-US" dirty="0"/>
               <a:t>Fifth level</a:t>
             </a:r>
-            <a:endParaRPr lang="en-US" dirty="0"/>
           </a:p>
         </p:txBody>
       </p:sp>
@@ -1593,7 +1583,7 @@
           <a:p>
             <a:pPr lvl="0"/>
             <a:r>
-              <a:rPr lang="en-US" dirty="0" smtClean="0"/>
+              <a:rPr lang="en-US" dirty="0"/>
               <a:t>Click to edit Master text styles</a:t>
             </a:r>
           </a:p>
@@ -1654,10 +1644,9 @@
           </a:lstStyle>
           <a:p>
             <a:r>
-              <a:rPr lang="en-US" dirty="0" smtClean="0"/>
+              <a:rPr lang="en-US" dirty="0"/>
               <a:t>Click to edit Master title style</a:t>
             </a:r>
-            <a:endParaRPr lang="en-US" dirty="0"/>
           </a:p>
         </p:txBody>
       </p:sp>
@@ -1784,7 +1773,7 @@
           <a:p>
             <a:pPr lvl="0"/>
             <a:r>
-              <a:rPr lang="en-US" dirty="0" smtClean="0"/>
+              <a:rPr lang="en-US" dirty="0"/>
               <a:t>Click to edit Master text styles</a:t>
             </a:r>
           </a:p>
@@ -2379,10 +2368,9 @@
           <a:lstStyle/>
           <a:p>
             <a:r>
-              <a:rPr lang="en-US" dirty="0" smtClean="0"/>
+              <a:rPr lang="en-US" dirty="0"/>
               <a:t>Click to edit Master title style</a:t>
             </a:r>
-            <a:endParaRPr lang="en-US" dirty="0"/>
           </a:p>
         </p:txBody>
       </p:sp>
@@ -2413,38 +2401,37 @@
           <a:p>
             <a:pPr lvl="0"/>
             <a:r>
-              <a:rPr lang="en-US" dirty="0" smtClean="0"/>
+              <a:rPr lang="en-US" dirty="0"/>
               <a:t>Click to edit Master text styles</a:t>
             </a:r>
           </a:p>
           <a:p>
             <a:pPr lvl="1"/>
             <a:r>
-              <a:rPr lang="en-US" dirty="0" smtClean="0"/>
+              <a:rPr lang="en-US" dirty="0"/>
               <a:t>Second level</a:t>
             </a:r>
           </a:p>
           <a:p>
             <a:pPr lvl="2"/>
             <a:r>
-              <a:rPr lang="en-US" dirty="0" smtClean="0"/>
+              <a:rPr lang="en-US" dirty="0"/>
               <a:t>Third level</a:t>
             </a:r>
           </a:p>
           <a:p>
             <a:pPr lvl="3"/>
             <a:r>
-              <a:rPr lang="en-US" dirty="0" smtClean="0"/>
+              <a:rPr lang="en-US" dirty="0"/>
               <a:t>Fourth level</a:t>
             </a:r>
           </a:p>
           <a:p>
             <a:pPr lvl="4"/>
             <a:r>
-              <a:rPr lang="en-US" dirty="0" smtClean="0"/>
+              <a:rPr lang="en-US" dirty="0"/>
               <a:t>Fifth level</a:t>
             </a:r>
-            <a:endParaRPr lang="en-US" dirty="0"/>
           </a:p>
         </p:txBody>
       </p:sp>
@@ -2467,13 +2454,6 @@
     <p:sldLayoutId id="2147483661" r:id="rId8"/>
     <p:sldLayoutId id="2147483662" r:id="rId9"/>
   </p:sldLayoutIdLst>
-  <p:timing>
-    <p:tnLst>
-      <p:par>
-        <p:cTn id="1" dur="indefinite" restart="never" nodeType="tmRoot"/>
-      </p:par>
-    </p:tnLst>
-  </p:timing>
   <p:txStyles>
     <p:titleStyle>
       <a:lvl1pPr algn="l" defTabSz="457200" rtl="0" eaLnBrk="1" latinLnBrk="0" hangingPunct="1">
@@ -2797,14 +2777,14 @@
           <a:lstStyle/>
           <a:p>
             <a:r>
-              <a:rPr lang="en-US" sz="3200" b="1" dirty="0" smtClean="0">
+              <a:rPr lang="en-US" sz="3200" b="1" dirty="0">
                 <a:solidFill>
                   <a:srgbClr val="217AA0"/>
                 </a:solidFill>
               </a:rPr>
               <a:t>IHE and HL7 Working Together</a:t>
             </a:r>
-            <a:endParaRPr lang="en-US" sz="2400" b="1" dirty="0" smtClean="0">
+            <a:endParaRPr lang="en-US" sz="2400" b="1" dirty="0">
               <a:solidFill>
                 <a:srgbClr val="217AA0"/>
               </a:solidFill>
@@ -2834,13 +2814,6 @@
       </p:transition>
     </mc:Fallback>
   </mc:AlternateContent>
-  <p:timing>
-    <p:tnLst>
-      <p:par>
-        <p:cTn id="1" dur="indefinite" restart="never" nodeType="tmRoot"/>
-      </p:par>
-    </p:tnLst>
-  </p:timing>
 </p:sld>
 </file>
 
@@ -2884,10 +2857,9 @@
           <a:lstStyle/>
           <a:p>
             <a:r>
-              <a:rPr lang="en-US" dirty="0" smtClean="0"/>
+              <a:rPr lang="en-US" dirty="0"/>
               <a:t>IHE USA ONC Cooperative Agreement</a:t>
             </a:r>
-            <a:endParaRPr lang="en-US" dirty="0"/>
           </a:p>
         </p:txBody>
       </p:sp>
@@ -2920,15 +2892,14 @@
           <a:lstStyle/>
           <a:p>
             <a:r>
-              <a:rPr lang="en-US" dirty="0" smtClean="0"/>
+              <a:rPr lang="en-US" dirty="0"/>
               <a:t>The Ask:</a:t>
             </a:r>
-            <a:endParaRPr lang="en-US" dirty="0"/>
           </a:p>
           <a:p>
             <a:pPr lvl="1"/>
             <a:r>
-              <a:rPr lang="en-US" dirty="0" smtClean="0"/>
+              <a:rPr lang="en-US" dirty="0"/>
               <a:t>Identify potential gaps that may inhibit the RESTful exchange of health information using FHIR®</a:t>
             </a:r>
             <a:endParaRPr lang="en-US" dirty="0">
@@ -2940,7 +2911,7 @@
           <a:p>
             <a:pPr lvl="1"/>
             <a:r>
-              <a:rPr lang="en-US" dirty="0" smtClean="0">
+              <a:rPr lang="en-US" dirty="0">
                 <a:solidFill>
                   <a:schemeClr val="tx1"/>
                 </a:solidFill>
@@ -3146,21 +3117,21 @@
           </a:lstStyle>
           <a:p>
             <a:r>
-              <a:rPr lang="en-US" dirty="0" smtClean="0"/>
+              <a:rPr lang="en-US" dirty="0"/>
               <a:t>The Deliverables:</a:t>
             </a:r>
           </a:p>
           <a:p>
             <a:pPr lvl="1"/>
             <a:r>
-              <a:rPr lang="en-US" dirty="0" smtClean="0"/>
+              <a:rPr lang="en-US" dirty="0"/>
               <a:t>Environmental scan and Gap Analysis of IHE profiles that support or complement RESTful exchange of health data</a:t>
             </a:r>
           </a:p>
           <a:p>
             <a:pPr lvl="1"/>
             <a:r>
-              <a:rPr lang="en-US" dirty="0" smtClean="0">
+              <a:rPr lang="en-US" dirty="0">
                 <a:solidFill>
                   <a:schemeClr val="tx1"/>
                 </a:solidFill>
@@ -3222,13 +3193,6 @@
       </p:transition>
     </mc:Fallback>
   </mc:AlternateContent>
-  <p:timing>
-    <p:tnLst>
-      <p:par>
-        <p:cTn id="1" dur="indefinite" restart="never" nodeType="tmRoot"/>
-      </p:par>
-    </p:tnLst>
-  </p:timing>
 </p:sld>
 </file>
 
@@ -3271,10 +3235,9 @@
           <a:lstStyle/>
           <a:p>
             <a:r>
-              <a:rPr lang="en-US" dirty="0" smtClean="0"/>
+              <a:rPr lang="en-US" dirty="0"/>
               <a:t>Additional Resources</a:t>
             </a:r>
-            <a:endParaRPr lang="en-US" dirty="0"/>
           </a:p>
         </p:txBody>
       </p:sp>
@@ -3302,25 +3265,24 @@
         </p:spPr>
         <p:txBody>
           <a:bodyPr>
-            <a:normAutofit fontScale="92500" lnSpcReduction="10000"/>
+            <a:normAutofit/>
           </a:bodyPr>
           <a:lstStyle/>
           <a:p>
             <a:r>
-              <a:rPr lang="en-US" dirty="0" smtClean="0"/>
-              <a:t>FHIR </a:t>
-            </a:r>
-            <a:r>
-              <a:rPr lang="en-US" dirty="0"/>
-              <a:t>Profiles </a:t>
+              <a:rPr lang="en-US" dirty="0"/>
+              <a:t>IHE Profiles – </a:t>
             </a:r>
             <a:r>
               <a:rPr lang="en-US" dirty="0">
                 <a:hlinkClick r:id="rId2"/>
               </a:rPr>
-              <a:t>https://wiki.ihe.net/index.php/Category:FHIR</a:t>
-            </a:r>
-            <a:endParaRPr lang="en-US" dirty="0"/>
+              <a:t>https://profiles.ihe.net</a:t>
+            </a:r>
+            <a:r>
+              <a:rPr lang="en-US" dirty="0"/>
+              <a:t> </a:t>
+            </a:r>
           </a:p>
           <a:p>
             <a:r>
@@ -3351,123 +3313,50 @@
           <a:p>
             <a:r>
               <a:rPr lang="en-US" dirty="0"/>
-              <a:t>Guidance </a:t>
-            </a:r>
-            <a:r>
-              <a:rPr lang="en-US" dirty="0" smtClean="0"/>
-              <a:t>for </a:t>
-            </a:r>
-            <a:r>
-              <a:rPr lang="en-US" dirty="0"/>
-              <a:t>IHE profile authors </a:t>
-            </a:r>
-            <a:r>
-              <a:rPr lang="en-US" dirty="0" smtClean="0"/>
-              <a:t>on </a:t>
-            </a:r>
-            <a:r>
-              <a:rPr lang="en-US" dirty="0"/>
-              <a:t>profiling FHIR   </a:t>
-            </a:r>
-          </a:p>
-          <a:p>
-            <a:pPr lvl="1"/>
+              <a:t>Introduction to IHE -</a:t>
+            </a:r>
             <a:r>
               <a:rPr lang="en-US" dirty="0">
                 <a:hlinkClick r:id="rId5"/>
               </a:rPr>
-              <a:t>https://wiki.ihe.net/index.php/Guidance_on_writing_Profiles_of_FHIR</a:t>
+              <a:t>https://healthcaresecprivacy.blogspot.com/2019/10/introduction-to-ihe.html</a:t>
             </a:r>
             <a:endParaRPr lang="en-US" dirty="0"/>
           </a:p>
           <a:p>
             <a:r>
-              <a:rPr lang="fr-FR" dirty="0"/>
-              <a:t>IHE FHIR </a:t>
-            </a:r>
-            <a:r>
-              <a:rPr lang="fr-FR" dirty="0" err="1"/>
-              <a:t>conformance</a:t>
-            </a:r>
-            <a:r>
-              <a:rPr lang="fr-FR" dirty="0"/>
-              <a:t> </a:t>
-            </a:r>
-            <a:r>
-              <a:rPr lang="fr-FR" dirty="0" err="1"/>
-              <a:t>resources</a:t>
-            </a:r>
-            <a:r>
-              <a:rPr lang="fr-FR" dirty="0"/>
-              <a:t> - </a:t>
-            </a:r>
-            <a:r>
-              <a:rPr lang="fr-FR" dirty="0">
+              <a:rPr lang="en-US" dirty="0"/>
+              <a:t>HL7 – </a:t>
+            </a:r>
+            <a:r>
+              <a:rPr lang="en-US" dirty="0">
                 <a:hlinkClick r:id="rId6"/>
               </a:rPr>
-              <a:t>https://github.com/IHE/fhir</a:t>
-            </a:r>
-            <a:endParaRPr lang="fr-FR" dirty="0"/>
-          </a:p>
-          <a:p>
-            <a:r>
-              <a:rPr lang="en-US" dirty="0" smtClean="0"/>
-              <a:t>Introduction to IHE -</a:t>
-            </a:r>
-            <a:r>
-              <a:rPr lang="en-US" dirty="0" smtClean="0">
-                <a:hlinkClick r:id="rId7"/>
-              </a:rPr>
-              <a:t>https</a:t>
+              <a:t>www.hl7.org</a:t>
+            </a:r>
+            <a:endParaRPr lang="en-US" dirty="0"/>
+          </a:p>
+          <a:p>
+            <a:r>
+              <a:rPr lang="en-US" dirty="0"/>
+              <a:t>IHE – </a:t>
             </a:r>
             <a:r>
               <a:rPr lang="en-US" dirty="0">
                 <a:hlinkClick r:id="rId7"/>
               </a:rPr>
-              <a:t>://</a:t>
-            </a:r>
-            <a:r>
-              <a:rPr lang="en-US" dirty="0" smtClean="0">
-                <a:hlinkClick r:id="rId7"/>
-              </a:rPr>
-              <a:t>healthcaresecprivacy.blogspot.com/2019/10/introduction-to-ihe.html</a:t>
-            </a:r>
-            <a:endParaRPr lang="en-US" dirty="0" smtClean="0"/>
-          </a:p>
-          <a:p>
-            <a:r>
-              <a:rPr lang="en-US" dirty="0" smtClean="0"/>
-              <a:t>HL7 – </a:t>
-            </a:r>
-            <a:r>
-              <a:rPr lang="en-US" dirty="0" smtClean="0">
+              <a:t>www.ihe.net</a:t>
+            </a:r>
+            <a:endParaRPr lang="en-US" dirty="0"/>
+          </a:p>
+          <a:p>
+            <a:r>
+              <a:rPr lang="en-US" dirty="0"/>
+              <a:t>IHE USA – </a:t>
+            </a:r>
+            <a:r>
+              <a:rPr lang="en-US" dirty="0">
                 <a:hlinkClick r:id="rId8"/>
-              </a:rPr>
-              <a:t>www.hl7.org</a:t>
-            </a:r>
-            <a:endParaRPr lang="en-US" dirty="0" smtClean="0"/>
-          </a:p>
-          <a:p>
-            <a:r>
-              <a:rPr lang="en-US" dirty="0"/>
-              <a:t>IHE – </a:t>
-            </a:r>
-            <a:r>
-              <a:rPr lang="en-US" dirty="0">
-                <a:hlinkClick r:id="rId9"/>
-              </a:rPr>
-              <a:t>www.ihe.net</a:t>
-            </a:r>
-            <a:endParaRPr lang="en-US" dirty="0"/>
-          </a:p>
-          <a:p>
-            <a:r>
-              <a:rPr lang="en-US" dirty="0" smtClean="0"/>
-              <a:t>IHE USA – </a:t>
-            </a:r>
-            <a:r>
-              <a:rPr lang="en-US" dirty="0" smtClean="0">
-                <a:hlinkClick r:id="rId10"/>
               </a:rPr>
               <a:t>www.iheusa.org</a:t>
             </a:r>
@@ -3497,13 +3386,6 @@
       </p:transition>
     </mc:Fallback>
   </mc:AlternateContent>
-  <p:timing>
-    <p:tnLst>
-      <p:par>
-        <p:cTn id="1" dur="indefinite" restart="never" nodeType="tmRoot"/>
-      </p:par>
-    </p:tnLst>
-  </p:timing>
 </p:sld>
 </file>
 
@@ -3576,7 +3458,7 @@
               </a:lnSpc>
               <a:buNone/>
             </a:pPr>
-            <a:endParaRPr lang="en-US" sz="1456" dirty="0" smtClean="0"/>
+            <a:endParaRPr lang="en-US" sz="1456" dirty="0"/>
           </a:p>
           <a:p>
             <a:pPr marL="0" indent="0">
@@ -3586,18 +3468,9 @@
               <a:buNone/>
             </a:pPr>
             <a:r>
-              <a:rPr lang="en-US" sz="1600" dirty="0" smtClean="0"/>
-              <a:t>A world in </a:t>
-            </a:r>
-            <a:r>
               <a:rPr lang="en-US" sz="1600" dirty="0"/>
-              <a:t>which everyone can securely access and use the right health data when and where they need </a:t>
-            </a:r>
-            <a:r>
-              <a:rPr lang="en-US" sz="1600" dirty="0" smtClean="0"/>
-              <a:t>it</a:t>
-            </a:r>
-            <a:endParaRPr lang="en-US" sz="1600" dirty="0"/>
+              <a:t>A world in which everyone can securely access and use the right health data when and where they need it</a:t>
+            </a:r>
           </a:p>
           <a:p>
             <a:pPr marL="0" indent="0">
@@ -3610,7 +3483,7 @@
               <a:buNone/>
             </a:pPr>
             <a:r>
-              <a:rPr lang="en-US" sz="1600" dirty="0" smtClean="0"/>
+              <a:rPr lang="en-US" sz="1600" dirty="0"/>
               <a:t>Enable seamless and secure access to health information that is usable whenever and wherever needed</a:t>
             </a:r>
             <a:endParaRPr lang="en-US" dirty="0"/>
@@ -3699,13 +3572,6 @@
       </p:transition>
     </mc:Fallback>
   </mc:AlternateContent>
-  <p:timing>
-    <p:tnLst>
-      <p:par>
-        <p:cTn id="1" dur="indefinite" restart="never" nodeType="tmRoot"/>
-      </p:par>
-    </p:tnLst>
-  </p:timing>
 </p:sld>
 </file>
 
@@ -3745,13 +3611,8 @@
           <a:p>
             <a:r>
               <a:rPr lang="en-US" dirty="0"/>
-              <a:t>Common </a:t>
-            </a:r>
-            <a:r>
-              <a:rPr lang="en-US" dirty="0" smtClean="0"/>
-              <a:t>Mission</a:t>
-            </a:r>
-            <a:endParaRPr lang="en-US" dirty="0"/>
+              <a:t>Common Mission</a:t>
+            </a:r>
           </a:p>
         </p:txBody>
       </p:sp>
@@ -3783,7 +3644,7 @@
               </a:lnSpc>
               <a:buNone/>
             </a:pPr>
-            <a:endParaRPr lang="en-US" sz="1456" dirty="0" smtClean="0"/>
+            <a:endParaRPr lang="en-US" sz="1456" dirty="0"/>
           </a:p>
           <a:p>
             <a:pPr marL="0" indent="0">
@@ -3793,16 +3654,8 @@
               <a:buNone/>
             </a:pPr>
             <a:r>
-              <a:rPr lang="en-US" sz="1600" dirty="0" smtClean="0"/>
-              <a:t>To </a:t>
-            </a:r>
-            <a:r>
               <a:rPr lang="en-US" sz="1600" dirty="0"/>
-              <a:t>provide standards that empower global health data </a:t>
-            </a:r>
-            <a:r>
-              <a:rPr lang="en-US" sz="1600" dirty="0" smtClean="0"/>
-              <a:t>interoperability</a:t>
+              <a:t>To provide standards that empower global health data interoperability</a:t>
             </a:r>
           </a:p>
           <a:p>
@@ -3820,13 +3673,8 @@
             </a:pPr>
             <a:r>
               <a:rPr lang="en-US" sz="1600" dirty="0"/>
-              <a:t>IHE improves healthcare by providing specifications, tools and services for interoperability. IHE engages clinicians, health authorities, industry, and users to develop, test, and implement standards-based solutions to vital health information </a:t>
-            </a:r>
-            <a:r>
-              <a:rPr lang="en-US" sz="1600" dirty="0" smtClean="0"/>
-              <a:t>needs</a:t>
-            </a:r>
-            <a:endParaRPr lang="en-US" sz="1600" dirty="0"/>
+              <a:t>IHE improves healthcare by providing specifications, tools and services for interoperability. IHE engages clinicians, health authorities, industry, and users to develop, test, and implement standards-based solutions to vital health information needs</a:t>
+            </a:r>
           </a:p>
           <a:p>
             <a:pPr marL="0" indent="0">
@@ -3918,13 +3766,6 @@
       </p:transition>
     </mc:Fallback>
   </mc:AlternateContent>
-  <p:timing>
-    <p:tnLst>
-      <p:par>
-        <p:cTn id="1" dur="indefinite" restart="never" nodeType="tmRoot"/>
-      </p:par>
-    </p:tnLst>
-  </p:timing>
 </p:sld>
 </file>
 
@@ -4013,20 +3854,16 @@
           </a:p>
           <a:p>
             <a:r>
-              <a:rPr lang="en-US" dirty="0" smtClean="0"/>
+              <a:rPr lang="en-US" dirty="0"/>
               <a:t>3 Annual IHE </a:t>
             </a:r>
             <a:r>
-              <a:rPr lang="en-US" dirty="0" err="1" smtClean="0"/>
+              <a:rPr lang="en-US" dirty="0" err="1"/>
               <a:t>Connectathons</a:t>
             </a:r>
             <a:r>
-              <a:rPr lang="en-US" dirty="0" smtClean="0"/>
-              <a:t> </a:t>
-            </a:r>
-            <a:r>
-              <a:rPr lang="en-US" dirty="0"/>
-              <a:t>(USA, Europe, Asia)</a:t>
+              <a:rPr lang="en-US" dirty="0"/>
+              <a:t> (USA, Europe, Asia)</a:t>
             </a:r>
           </a:p>
           <a:p>
@@ -4038,15 +3875,7 @@
           <a:p>
             <a:r>
               <a:rPr lang="en-US" dirty="0"/>
-              <a:t>N</a:t>
-            </a:r>
-            <a:r>
-              <a:rPr lang="en-US" dirty="0" smtClean="0"/>
-              <a:t>ational </a:t>
-            </a:r>
-            <a:r>
-              <a:rPr lang="en-US" dirty="0"/>
-              <a:t>deployment committees in 17 countries</a:t>
+              <a:t>National deployment committees in 17 countries</a:t>
             </a:r>
           </a:p>
         </p:txBody>
@@ -4278,10 +4107,9 @@
           </a:lstStyle>
           <a:p>
             <a:r>
-              <a:rPr lang="en-US" dirty="0" smtClean="0"/>
+              <a:rPr lang="en-US" dirty="0"/>
               <a:t>Volunteer Structure</a:t>
             </a:r>
-            <a:endParaRPr lang="en-US" dirty="0"/>
           </a:p>
         </p:txBody>
       </p:sp>
@@ -4307,13 +4135,6 @@
       </p:transition>
     </mc:Fallback>
   </mc:AlternateContent>
-  <p:timing>
-    <p:tnLst>
-      <p:par>
-        <p:cTn id="1" dur="indefinite" restart="never" nodeType="tmRoot"/>
-      </p:par>
-    </p:tnLst>
-  </p:timing>
 </p:sld>
 </file>
 
@@ -4382,13 +4203,8 @@
           <a:p>
             <a:r>
               <a:rPr lang="en-US" dirty="0"/>
-              <a:t>IHE Profile </a:t>
-            </a:r>
-            <a:r>
-              <a:rPr lang="en-US" dirty="0" smtClean="0"/>
-              <a:t>Development Process </a:t>
-            </a:r>
-            <a:endParaRPr lang="en-US" dirty="0"/>
+              <a:t>IHE Profile Development Process </a:t>
+            </a:r>
           </a:p>
         </p:txBody>
       </p:sp>
@@ -4591,13 +4407,6 @@
       </p:transition>
     </mc:Fallback>
   </mc:AlternateContent>
-  <p:timing>
-    <p:tnLst>
-      <p:par>
-        <p:cTn id="1" dur="indefinite" restart="never" nodeType="tmRoot"/>
-      </p:par>
-    </p:tnLst>
-  </p:timing>
 </p:sld>
 </file>
 
@@ -4700,15 +4509,7 @@
             </a:r>
             <a:r>
               <a:rPr lang="en-US" sz="1600" dirty="0"/>
-              <a:t> allow for ongoing testing </a:t>
-            </a:r>
-            <a:r>
-              <a:rPr lang="en-US" sz="1600" dirty="0" smtClean="0"/>
-              <a:t>of specifications by </a:t>
-            </a:r>
-            <a:r>
-              <a:rPr lang="en-US" sz="1600" dirty="0"/>
-              <a:t>implementers</a:t>
+              <a:t> allow for ongoing testing of specifications by implementers</a:t>
             </a:r>
           </a:p>
           <a:p>
@@ -4771,13 +4572,6 @@
       </p:transition>
     </mc:Fallback>
   </mc:AlternateContent>
-  <p:timing>
-    <p:tnLst>
-      <p:par>
-        <p:cTn id="1" dur="indefinite" restart="never" nodeType="tmRoot"/>
-      </p:par>
-    </p:tnLst>
-  </p:timing>
 </p:sld>
 </file>
 
@@ -4821,21 +4615,8 @@
           <a:p>
             <a:r>
               <a:rPr lang="en-US" dirty="0"/>
-              <a:t>Profiles </a:t>
-            </a:r>
-            <a:r>
-              <a:rPr lang="en-US" dirty="0" smtClean="0"/>
-              <a:t>vs </a:t>
-            </a:r>
-            <a:r>
-              <a:rPr lang="en-US" dirty="0"/>
-              <a:t>Implementation </a:t>
-            </a:r>
-            <a:r>
-              <a:rPr lang="en-US" dirty="0" smtClean="0"/>
-              <a:t>Guides</a:t>
-            </a:r>
-            <a:endParaRPr lang="en-US" dirty="0"/>
+              <a:t>Profiles vs Implementation Guides</a:t>
+            </a:r>
           </a:p>
         </p:txBody>
       </p:sp>
@@ -4869,110 +4650,43 @@
           <a:p>
             <a:r>
               <a:rPr lang="en-US" sz="1600" dirty="0"/>
-              <a:t>IHE creates and maintains </a:t>
-            </a:r>
-            <a:r>
-              <a:rPr lang="en-US" sz="1600" dirty="0" smtClean="0"/>
-              <a:t>implementation </a:t>
-            </a:r>
+              <a:t>IHE creates and maintains implementation guidelines called IHE Profiles, which are published in a domain-specific set of specifications called the IHE Technical Frameworks.</a:t>
+            </a:r>
+          </a:p>
+          <a:p>
             <a:r>
               <a:rPr lang="en-US" sz="1600" dirty="0"/>
-              <a:t>guidelines called IHE Profiles, which </a:t>
-            </a:r>
-            <a:r>
-              <a:rPr lang="en-US" sz="1600" dirty="0" smtClean="0"/>
-              <a:t>are published in a domain-specific set of specifications called the IHE Technical Frameworks.</a:t>
-            </a:r>
-          </a:p>
-          <a:p>
-            <a:r>
-              <a:rPr lang="en-US" sz="1600" dirty="0" smtClean="0"/>
-              <a:t>IHE </a:t>
-            </a:r>
+              <a:t>IHE Profiles provide a common language for purchasers and vendors to discuss the integration needs of healthcare sites and the integration capabilities of health IT products.</a:t>
+            </a:r>
+          </a:p>
+          <a:p>
+            <a:endParaRPr lang="en-US" sz="1000" dirty="0"/>
+          </a:p>
+          <a:p>
             <a:r>
               <a:rPr lang="en-US" sz="1600" dirty="0"/>
-              <a:t>Profiles provide a common language for purchasers and vendors to discuss the integration needs of healthcare sites and the integration capabilities of </a:t>
-            </a:r>
-            <a:r>
-              <a:rPr lang="en-US" sz="1600" dirty="0" smtClean="0"/>
-              <a:t>health </a:t>
+              <a:t>HL7 FHIR Profiles define a group of </a:t>
+            </a:r>
+            <a:r>
+              <a:rPr lang="en-US" sz="1600" dirty="0" err="1"/>
+              <a:t>StructureDefinitions</a:t>
             </a:r>
             <a:r>
               <a:rPr lang="en-US" sz="1600" dirty="0"/>
-              <a:t>IT </a:t>
-            </a:r>
-            <a:r>
-              <a:rPr lang="en-US" sz="1600" dirty="0" smtClean="0"/>
-              <a:t>products.</a:t>
-            </a:r>
-          </a:p>
-          <a:p>
-            <a:endParaRPr lang="en-US" sz="1000" dirty="0"/>
+              <a:t> (Constraints or Extensions), Value Sets, and examples associated with a FHIR resource for a specific problem or use case.</a:t>
+            </a:r>
           </a:p>
           <a:p>
             <a:r>
               <a:rPr lang="en-US" sz="1600" dirty="0"/>
-              <a:t>HL7 FHIR Profiles define a </a:t>
-            </a:r>
-            <a:r>
-              <a:rPr lang="en-US" sz="1600" dirty="0" smtClean="0"/>
-              <a:t>group of </a:t>
-            </a:r>
-            <a:r>
-              <a:rPr lang="en-US" sz="1600" dirty="0" err="1" smtClean="0"/>
-              <a:t>StructureDefinitions</a:t>
-            </a:r>
-            <a:r>
-              <a:rPr lang="en-US" sz="1600" dirty="0" smtClean="0"/>
-              <a:t> (Constraints or Extensions), Value Sets, and examples associated with </a:t>
-            </a:r>
+              <a:t>A FHIR Implementation Guide is a set of rules about how FHIR resources are to be used to solve a specific problem.</a:t>
+            </a:r>
+          </a:p>
+          <a:p>
             <a:r>
               <a:rPr lang="en-US" sz="1600" dirty="0"/>
-              <a:t>a FHIR resource for a specific problem or use </a:t>
-            </a:r>
-            <a:r>
-              <a:rPr lang="en-US" sz="1600" dirty="0" smtClean="0"/>
-              <a:t>case.</a:t>
-            </a:r>
-            <a:endParaRPr lang="en-US" sz="1600" dirty="0"/>
-          </a:p>
-          <a:p>
-            <a:r>
-              <a:rPr lang="en-US" sz="1600" dirty="0"/>
-              <a:t>A FHIR Implementation Guide is a set of rules about how FHIR resources are to be used to solve a specific </a:t>
-            </a:r>
-            <a:r>
-              <a:rPr lang="en-US" sz="1600" dirty="0" smtClean="0"/>
-              <a:t>problem.</a:t>
-            </a:r>
-            <a:endParaRPr lang="en-US" sz="1600" dirty="0"/>
-          </a:p>
-          <a:p>
-            <a:r>
-              <a:rPr lang="en-US" sz="1600" dirty="0"/>
-              <a:t>HL7 EHR Functional Profiles define functional requirements for use cases such as Behavioral Health, Child Health, Long </a:t>
-            </a:r>
-            <a:r>
-              <a:rPr lang="en-US" sz="1600" dirty="0" smtClean="0"/>
-              <a:t>Term </a:t>
-            </a:r>
-            <a:r>
-              <a:rPr lang="en-US" sz="1600" dirty="0"/>
-              <a:t>C</a:t>
-            </a:r>
-            <a:r>
-              <a:rPr lang="en-US" sz="1600" dirty="0" smtClean="0"/>
-              <a:t>are </a:t>
-            </a:r>
-            <a:r>
-              <a:rPr lang="en-US" sz="1600" dirty="0"/>
-              <a:t>. . </a:t>
-            </a:r>
-            <a:r>
-              <a:rPr lang="en-US" sz="1600" dirty="0" smtClean="0"/>
-              <a:t>.</a:t>
-            </a:r>
-            <a:endParaRPr lang="en-US" sz="1600" dirty="0"/>
+              <a:t>HL7 EHR Functional Profiles define functional requirements for use cases such as Behavioral Health, Child Health, Long Term Care . . .</a:t>
+            </a:r>
           </a:p>
         </p:txBody>
       </p:sp>
@@ -5058,13 +4772,6 @@
       </p:transition>
     </mc:Fallback>
   </mc:AlternateContent>
-  <p:timing>
-    <p:tnLst>
-      <p:par>
-        <p:cTn id="1" dur="indefinite" restart="never" nodeType="tmRoot"/>
-      </p:par>
-    </p:tnLst>
-  </p:timing>
 </p:sld>
 </file>
 
@@ -5289,13 +4996,6 @@
       </p:transition>
     </mc:Fallback>
   </mc:AlternateContent>
-  <p:timing>
-    <p:tnLst>
-      <p:par>
-        <p:cTn id="1" dur="indefinite" restart="never" nodeType="tmRoot"/>
-      </p:par>
-    </p:tnLst>
-  </p:timing>
 </p:sld>
 </file>
 
@@ -5339,13 +5039,8 @@
           <a:p>
             <a:r>
               <a:rPr lang="en-US" dirty="0"/>
-              <a:t>Connectathon – IHE vs </a:t>
-            </a:r>
-            <a:r>
-              <a:rPr lang="en-US" dirty="0" smtClean="0"/>
-              <a:t>HL7 FHIR</a:t>
-            </a:r>
-            <a:endParaRPr lang="en-US" dirty="0"/>
+              <a:t>Connectathon – IHE vs HL7 FHIR</a:t>
+            </a:r>
           </a:p>
         </p:txBody>
       </p:sp>
@@ -5378,37 +5073,8 @@
           <a:lstStyle/>
           <a:p>
             <a:r>
-              <a:rPr lang="en-US" dirty="0" smtClean="0"/>
+              <a:rPr lang="en-US" dirty="0"/>
               <a:t>HL7 FHIR </a:t>
-            </a:r>
-            <a:r>
-              <a:rPr lang="en-US" dirty="0" err="1" smtClean="0"/>
-              <a:t>Connectathons</a:t>
-            </a:r>
-            <a:r>
-              <a:rPr lang="en-US" dirty="0" smtClean="0"/>
-              <a:t> help implementers assess, test and explore new opportunities for applying the FHIR specifications.</a:t>
-            </a:r>
-          </a:p>
-          <a:p>
-            <a:pPr lvl="1"/>
-            <a:r>
-              <a:rPr lang="en-US" dirty="0" smtClean="0"/>
-              <a:t>Testing as part of an HL7 </a:t>
-            </a:r>
-            <a:r>
-              <a:rPr lang="en-US" dirty="0" err="1" smtClean="0"/>
-              <a:t>Connectathon</a:t>
-            </a:r>
-            <a:r>
-              <a:rPr lang="en-US" dirty="0" smtClean="0"/>
-              <a:t> is a pre-requisite for progressing resources and implementation guides within the FHIR Maturity Model</a:t>
-            </a:r>
-          </a:p>
-          <a:p>
-            <a:r>
-              <a:rPr lang="en-US" dirty="0" smtClean="0"/>
-              <a:t>IHE </a:t>
             </a:r>
             <a:r>
               <a:rPr lang="en-US" dirty="0" err="1"/>
@@ -5416,24 +5082,44 @@
             </a:r>
             <a:r>
               <a:rPr lang="en-US" dirty="0"/>
-              <a:t> provide a </a:t>
-            </a:r>
-            <a:r>
-              <a:rPr lang="en-US" dirty="0" smtClean="0"/>
-              <a:t>rigorous, detailed testing and implementation process for products and systems to enable </a:t>
-            </a:r>
-            <a:r>
-              <a:rPr lang="en-US" dirty="0"/>
-              <a:t>standards-based interoperability. </a:t>
+              <a:t> help implementers assess, test and explore new opportunities for applying the FHIR specifications.</a:t>
             </a:r>
           </a:p>
           <a:p>
             <a:pPr lvl="1"/>
             <a:r>
-              <a:rPr lang="en-US" dirty="0" smtClean="0"/>
+              <a:rPr lang="en-US" dirty="0"/>
+              <a:t>Testing as part of an HL7 </a:t>
+            </a:r>
+            <a:r>
+              <a:rPr lang="en-US" dirty="0" err="1"/>
+              <a:t>Connectathon</a:t>
+            </a:r>
+            <a:r>
+              <a:rPr lang="en-US" dirty="0"/>
+              <a:t> is a pre-requisite for progressing resources and implementation guides within the FHIR Maturity Model</a:t>
+            </a:r>
+          </a:p>
+          <a:p>
+            <a:r>
+              <a:rPr lang="en-US" dirty="0"/>
+              <a:t>IHE </a:t>
+            </a:r>
+            <a:r>
+              <a:rPr lang="en-US" dirty="0" err="1"/>
+              <a:t>Connectathons</a:t>
+            </a:r>
+            <a:r>
+              <a:rPr lang="en-US" dirty="0"/>
+              <a:t> provide a rigorous, detailed testing and implementation process for products and systems to enable standards-based interoperability. </a:t>
+            </a:r>
+          </a:p>
+          <a:p>
+            <a:pPr lvl="1"/>
+            <a:r>
+              <a:rPr lang="en-US" dirty="0"/>
               <a:t>Systems exchange information in a structured and supervised peer-to-peer testing environment, performing transactions required for the roles they perform in carefully defined interoperability use cases (profiles).</a:t>
             </a:r>
-            <a:endParaRPr lang="en-US" dirty="0"/>
           </a:p>
         </p:txBody>
       </p:sp>
@@ -5519,13 +5205,6 @@
       </p:transition>
     </mc:Fallback>
   </mc:AlternateContent>
-  <p:timing>
-    <p:tnLst>
-      <p:par>
-        <p:cTn id="1" dur="indefinite" restart="never" nodeType="tmRoot"/>
-      </p:par>
-    </p:tnLst>
-  </p:timing>
 </p:sld>
 </file>
 
@@ -6109,24 +5788,6 @@
 </file>
 
 <file path=customXml/item1.xml><?xml version="1.0" encoding="utf-8"?>
-<?mso-contentType ?>
-<FormTemplates xmlns="http://schemas.microsoft.com/sharepoint/v3/contenttype/forms">
-  <Display>DocumentLibraryForm</Display>
-  <Edit>DocumentLibraryForm</Edit>
-  <New>DocumentLibraryForm</New>
-</FormTemplates>
-</file>
-
-<file path=customXml/item2.xml><?xml version="1.0" encoding="utf-8"?>
-<p:properties xmlns:p="http://schemas.microsoft.com/office/2006/metadata/properties" xmlns:xsi="http://www.w3.org/2001/XMLSchema-instance" xmlns:pc="http://schemas.microsoft.com/office/infopath/2007/PartnerControls">
-  <documentManagement>
-    <PublishingExpirationDate xmlns="http://schemas.microsoft.com/sharepoint/v3" xsi:nil="true"/>
-    <PublishingStartDate xmlns="http://schemas.microsoft.com/sharepoint/v3" xsi:nil="true"/>
-  </documentManagement>
-</p:properties>
-</file>
-
-<file path=customXml/item3.xml><?xml version="1.0" encoding="utf-8"?>
 <ct:contentTypeSchema xmlns:ct="http://schemas.microsoft.com/office/2006/metadata/contentType" xmlns:ma="http://schemas.microsoft.com/office/2006/metadata/properties/metaAttributes" ct:_="" ma:_="" ma:contentTypeName="Document" ma:contentTypeID="0x0101006F55114679DA3B499BC3C1AEC85F665A" ma:contentTypeVersion="1" ma:contentTypeDescription="Create a new document." ma:contentTypeScope="" ma:versionID="348ca2672184a86fa4aa69f21c5b406e">
   <xsd:schema xmlns:xsd="http://www.w3.org/2001/XMLSchema" xmlns:xs="http://www.w3.org/2001/XMLSchema" xmlns:p="http://schemas.microsoft.com/office/2006/metadata/properties" xmlns:ns1="http://schemas.microsoft.com/sharepoint/v3" targetNamespace="http://schemas.microsoft.com/office/2006/metadata/properties" ma:root="true" ma:fieldsID="4dcce58c87e9fcebab8021569449a8d0" ns1:_="">
     <xsd:import namespace="http://schemas.microsoft.com/sharepoint/v3"/>
@@ -6258,10 +5919,38 @@
 </ct:contentTypeSchema>
 </file>
 
+<file path=customXml/item2.xml><?xml version="1.0" encoding="utf-8"?>
+<p:properties xmlns:p="http://schemas.microsoft.com/office/2006/metadata/properties" xmlns:xsi="http://www.w3.org/2001/XMLSchema-instance" xmlns:pc="http://schemas.microsoft.com/office/infopath/2007/PartnerControls">
+  <documentManagement>
+    <PublishingExpirationDate xmlns="http://schemas.microsoft.com/sharepoint/v3" xsi:nil="true"/>
+    <PublishingStartDate xmlns="http://schemas.microsoft.com/sharepoint/v3" xsi:nil="true"/>
+  </documentManagement>
+</p:properties>
+</file>
+
+<file path=customXml/item3.xml><?xml version="1.0" encoding="utf-8"?>
+<?mso-contentType ?>
+<FormTemplates xmlns="http://schemas.microsoft.com/sharepoint/v3/contenttype/forms">
+  <Display>DocumentLibraryForm</Display>
+  <Edit>DocumentLibraryForm</Edit>
+  <New>DocumentLibraryForm</New>
+</FormTemplates>
+</file>
+
 <file path=customXml/itemProps1.xml><?xml version="1.0" encoding="utf-8"?>
-<ds:datastoreItem xmlns:ds="http://schemas.openxmlformats.org/officeDocument/2006/customXml" ds:itemID="{4E2F795C-0587-4BC5-B45B-D58AB09E6DC5}">
+<ds:datastoreItem xmlns:ds="http://schemas.openxmlformats.org/officeDocument/2006/customXml" ds:itemID="{CDB5E079-C9FE-43F8-AA19-03F8227CA213}">
   <ds:schemaRefs>
-    <ds:schemaRef ds:uri="http://schemas.microsoft.com/sharepoint/v3/contenttype/forms"/>
+    <ds:schemaRef ds:uri="http://schemas.microsoft.com/office/2006/metadata/contentType"/>
+    <ds:schemaRef ds:uri="http://schemas.microsoft.com/office/2006/metadata/properties/metaAttributes"/>
+    <ds:schemaRef ds:uri="http://www.w3.org/2001/XMLSchema"/>
+    <ds:schemaRef ds:uri="http://schemas.microsoft.com/office/2006/metadata/properties"/>
+    <ds:schemaRef ds:uri="http://schemas.microsoft.com/sharepoint/v3"/>
+    <ds:schemaRef ds:uri="http://schemas.microsoft.com/office/2006/documentManagement/types"/>
+    <ds:schemaRef ds:uri="http://schemas.microsoft.com/office/infopath/2007/PartnerControls"/>
+    <ds:schemaRef ds:uri="http://schemas.openxmlformats.org/package/2006/metadata/core-properties"/>
+    <ds:schemaRef ds:uri="http://purl.org/dc/elements/1.1/"/>
+    <ds:schemaRef ds:uri="http://purl.org/dc/terms/"/>
+    <ds:schemaRef ds:uri="http://schemas.microsoft.com/internal/obd"/>
   </ds:schemaRefs>
 </ds:datastoreItem>
 </file>
@@ -6283,19 +5972,9 @@
 </file>
 
 <file path=customXml/itemProps3.xml><?xml version="1.0" encoding="utf-8"?>
-<ds:datastoreItem xmlns:ds="http://schemas.openxmlformats.org/officeDocument/2006/customXml" ds:itemID="{CDB5E079-C9FE-43F8-AA19-03F8227CA213}">
+<ds:datastoreItem xmlns:ds="http://schemas.openxmlformats.org/officeDocument/2006/customXml" ds:itemID="{4E2F795C-0587-4BC5-B45B-D58AB09E6DC5}">
   <ds:schemaRefs>
-    <ds:schemaRef ds:uri="http://schemas.microsoft.com/office/2006/metadata/contentType"/>
-    <ds:schemaRef ds:uri="http://schemas.microsoft.com/office/2006/metadata/properties/metaAttributes"/>
-    <ds:schemaRef ds:uri="http://www.w3.org/2001/XMLSchema"/>
-    <ds:schemaRef ds:uri="http://schemas.microsoft.com/office/2006/metadata/properties"/>
-    <ds:schemaRef ds:uri="http://schemas.microsoft.com/sharepoint/v3"/>
-    <ds:schemaRef ds:uri="http://schemas.microsoft.com/office/2006/documentManagement/types"/>
-    <ds:schemaRef ds:uri="http://schemas.microsoft.com/office/infopath/2007/PartnerControls"/>
-    <ds:schemaRef ds:uri="http://schemas.openxmlformats.org/package/2006/metadata/core-properties"/>
-    <ds:schemaRef ds:uri="http://purl.org/dc/elements/1.1/"/>
-    <ds:schemaRef ds:uri="http://purl.org/dc/terms/"/>
-    <ds:schemaRef ds:uri="http://schemas.microsoft.com/internal/obd"/>
+    <ds:schemaRef ds:uri="http://schemas.microsoft.com/sharepoint/v3/contenttype/forms"/>
   </ds:schemaRefs>
 </ds:datastoreItem>
 </file>
</xml_diff>